<commit_message>
Add plot and ppt output for cycling module
</commit_message>
<xml_diff>
--- a/estrousCycleTemplate.pptx
+++ b/estrousCycleTemplate.pptx
@@ -4,9 +4,6 @@
   <p:sldMasterIdLst>
     <p:sldMasterId id="2147483661" r:id="rId1"/>
   </p:sldMasterIdLst>
-  <p:sldIdLst>
-    <p:sldId id="256" r:id="rId2"/>
-  </p:sldIdLst>
   <p:sldSz cx="10058400" cy="7772400"/>
   <p:notesSz cx="6858000" cy="9144000"/>
   <p:defaultTextStyle>
@@ -147,7 +144,7 @@
         </p:nvSpPr>
         <p:spPr>
           <a:xfrm>
-            <a:off x="0" y="282967"/>
+            <a:off x="-1027" y="537565"/>
             <a:ext cx="2448553" cy="1956816"/>
           </a:xfrm>
         </p:spPr>
@@ -177,7 +174,7 @@
         </p:nvSpPr>
         <p:spPr>
           <a:xfrm>
-            <a:off x="0" y="-1"/>
+            <a:off x="-1027" y="-1"/>
             <a:ext cx="2448553" cy="282967"/>
           </a:xfrm>
         </p:spPr>
@@ -230,7 +227,7 @@
         </p:nvSpPr>
         <p:spPr>
           <a:xfrm>
-            <a:off x="2536616" y="282968"/>
+            <a:off x="2535589" y="537566"/>
             <a:ext cx="2448553" cy="1958842"/>
           </a:xfrm>
         </p:spPr>
@@ -260,7 +257,7 @@
         </p:nvSpPr>
         <p:spPr>
           <a:xfrm>
-            <a:off x="2536616" y="0"/>
+            <a:off x="2535589" y="0"/>
             <a:ext cx="2448553" cy="282967"/>
           </a:xfrm>
         </p:spPr>
@@ -313,7 +310,7 @@
         </p:nvSpPr>
         <p:spPr>
           <a:xfrm>
-            <a:off x="5073232" y="282965"/>
+            <a:off x="5072205" y="537563"/>
             <a:ext cx="2448553" cy="1958842"/>
           </a:xfrm>
         </p:spPr>
@@ -343,7 +340,7 @@
         </p:nvSpPr>
         <p:spPr>
           <a:xfrm>
-            <a:off x="5073232" y="-3"/>
+            <a:off x="5072205" y="-3"/>
             <a:ext cx="2448553" cy="282967"/>
           </a:xfrm>
         </p:spPr>
@@ -396,7 +393,7 @@
         </p:nvSpPr>
         <p:spPr>
           <a:xfrm>
-            <a:off x="7609847" y="282968"/>
+            <a:off x="7608820" y="537566"/>
             <a:ext cx="2448553" cy="1958842"/>
           </a:xfrm>
         </p:spPr>
@@ -426,7 +423,7 @@
         </p:nvSpPr>
         <p:spPr>
           <a:xfrm>
-            <a:off x="7609847" y="0"/>
+            <a:off x="7608820" y="0"/>
             <a:ext cx="2448553" cy="282967"/>
           </a:xfrm>
         </p:spPr>
@@ -479,7 +476,7 @@
         </p:nvSpPr>
         <p:spPr>
           <a:xfrm>
-            <a:off x="0" y="2906779"/>
+            <a:off x="-1027" y="3121185"/>
             <a:ext cx="2448553" cy="1958842"/>
           </a:xfrm>
         </p:spPr>
@@ -509,7 +506,7 @@
         </p:nvSpPr>
         <p:spPr>
           <a:xfrm>
-            <a:off x="0" y="2623806"/>
+            <a:off x="-1027" y="2583452"/>
             <a:ext cx="2448553" cy="282967"/>
           </a:xfrm>
         </p:spPr>
@@ -562,7 +559,7 @@
         </p:nvSpPr>
         <p:spPr>
           <a:xfrm>
-            <a:off x="2536616" y="2906779"/>
+            <a:off x="2535589" y="3121185"/>
             <a:ext cx="2448553" cy="1958842"/>
           </a:xfrm>
         </p:spPr>
@@ -592,7 +589,7 @@
         </p:nvSpPr>
         <p:spPr>
           <a:xfrm>
-            <a:off x="2536616" y="2623807"/>
+            <a:off x="2535589" y="2583453"/>
             <a:ext cx="2448553" cy="282967"/>
           </a:xfrm>
         </p:spPr>
@@ -645,7 +642,7 @@
         </p:nvSpPr>
         <p:spPr>
           <a:xfrm>
-            <a:off x="5073232" y="2906779"/>
+            <a:off x="5072205" y="3121185"/>
             <a:ext cx="2448553" cy="1958842"/>
           </a:xfrm>
         </p:spPr>
@@ -675,7 +672,7 @@
         </p:nvSpPr>
         <p:spPr>
           <a:xfrm>
-            <a:off x="5073232" y="2623804"/>
+            <a:off x="5072205" y="2583450"/>
             <a:ext cx="2448553" cy="282967"/>
           </a:xfrm>
         </p:spPr>
@@ -728,7 +725,7 @@
         </p:nvSpPr>
         <p:spPr>
           <a:xfrm>
-            <a:off x="7609847" y="2906779"/>
+            <a:off x="7608820" y="3121185"/>
             <a:ext cx="2448553" cy="1958842"/>
           </a:xfrm>
         </p:spPr>
@@ -758,7 +755,7 @@
         </p:nvSpPr>
         <p:spPr>
           <a:xfrm>
-            <a:off x="7609847" y="2623807"/>
+            <a:off x="7608820" y="2583453"/>
             <a:ext cx="2448553" cy="282967"/>
           </a:xfrm>
         </p:spPr>
@@ -811,7 +808,7 @@
         </p:nvSpPr>
         <p:spPr>
           <a:xfrm>
-            <a:off x="29497" y="5813557"/>
+            <a:off x="-1027" y="5813557"/>
             <a:ext cx="2448553" cy="1958842"/>
           </a:xfrm>
         </p:spPr>
@@ -841,7 +838,7 @@
         </p:nvSpPr>
         <p:spPr>
           <a:xfrm>
-            <a:off x="29497" y="5530589"/>
+            <a:off x="-1027" y="5276034"/>
             <a:ext cx="2448553" cy="282967"/>
           </a:xfrm>
         </p:spPr>
@@ -894,7 +891,7 @@
         </p:nvSpPr>
         <p:spPr>
           <a:xfrm>
-            <a:off x="2566113" y="5813558"/>
+            <a:off x="2535589" y="5813558"/>
             <a:ext cx="2448553" cy="1958842"/>
           </a:xfrm>
         </p:spPr>
@@ -924,7 +921,7 @@
         </p:nvSpPr>
         <p:spPr>
           <a:xfrm>
-            <a:off x="2566113" y="5530590"/>
+            <a:off x="2535589" y="5276035"/>
             <a:ext cx="2448553" cy="282967"/>
           </a:xfrm>
         </p:spPr>
@@ -977,7 +974,7 @@
         </p:nvSpPr>
         <p:spPr>
           <a:xfrm>
-            <a:off x="5102729" y="5813555"/>
+            <a:off x="5072205" y="5813555"/>
             <a:ext cx="2448553" cy="1958842"/>
           </a:xfrm>
         </p:spPr>
@@ -1007,7 +1004,7 @@
         </p:nvSpPr>
         <p:spPr>
           <a:xfrm>
-            <a:off x="5102729" y="5530587"/>
+            <a:off x="5072205" y="5276032"/>
             <a:ext cx="2448553" cy="282967"/>
           </a:xfrm>
         </p:spPr>
@@ -1060,7 +1057,7 @@
         </p:nvSpPr>
         <p:spPr>
           <a:xfrm>
-            <a:off x="7639344" y="5813558"/>
+            <a:off x="7608820" y="5813558"/>
             <a:ext cx="2448553" cy="1958842"/>
           </a:xfrm>
         </p:spPr>
@@ -1090,7 +1087,643 @@
         </p:nvSpPr>
         <p:spPr>
           <a:xfrm>
-            <a:off x="7639344" y="5530590"/>
+            <a:off x="7608820" y="5276035"/>
+            <a:ext cx="2448553" cy="282967"/>
+          </a:xfrm>
+        </p:spPr>
+        <p:txBody>
+          <a:bodyPr>
+            <a:noAutofit/>
+          </a:bodyPr>
+          <a:lstStyle>
+            <a:lvl1pPr marL="0" indent="0">
+              <a:buNone/>
+              <a:defRPr sz="1300"/>
+            </a:lvl1pPr>
+            <a:lvl2pPr>
+              <a:defRPr sz="1200"/>
+            </a:lvl2pPr>
+            <a:lvl3pPr>
+              <a:defRPr sz="1200"/>
+            </a:lvl3pPr>
+            <a:lvl4pPr>
+              <a:defRPr sz="1200"/>
+            </a:lvl4pPr>
+            <a:lvl5pPr>
+              <a:defRPr sz="1200"/>
+            </a:lvl5pPr>
+          </a:lstStyle>
+          <a:p>
+            <a:pPr lvl="0"/>
+            <a:r>
+              <a:rPr lang="en-US" dirty="0"/>
+              <a:t>id</a:t>
+            </a:r>
+          </a:p>
+        </p:txBody>
+      </p:sp>
+      <p:sp>
+        <p:nvSpPr>
+          <p:cNvPr id="26" name="stage9">
+            <a:extLst>
+              <a:ext uri="{FF2B5EF4-FFF2-40B4-BE49-F238E27FC236}">
+                <a16:creationId xmlns:a16="http://schemas.microsoft.com/office/drawing/2014/main" id="{0C227659-8475-474F-8CFB-CAE5CA4AB14C}"/>
+              </a:ext>
+            </a:extLst>
+          </p:cNvPr>
+          <p:cNvSpPr>
+            <a:spLocks noGrp="1"/>
+          </p:cNvSpPr>
+          <p:nvPr>
+            <p:ph type="body" sz="quarter" idx="42" hasCustomPrompt="1"/>
+          </p:nvPr>
+        </p:nvSpPr>
+        <p:spPr>
+          <a:xfrm>
+            <a:off x="-1027" y="5530590"/>
+            <a:ext cx="2448553" cy="282967"/>
+          </a:xfrm>
+        </p:spPr>
+        <p:txBody>
+          <a:bodyPr>
+            <a:noAutofit/>
+          </a:bodyPr>
+          <a:lstStyle>
+            <a:lvl1pPr marL="0" indent="0">
+              <a:buNone/>
+              <a:defRPr sz="1300"/>
+            </a:lvl1pPr>
+            <a:lvl2pPr>
+              <a:defRPr sz="1200"/>
+            </a:lvl2pPr>
+            <a:lvl3pPr>
+              <a:defRPr sz="1200"/>
+            </a:lvl3pPr>
+            <a:lvl4pPr>
+              <a:defRPr sz="1200"/>
+            </a:lvl4pPr>
+            <a:lvl5pPr>
+              <a:defRPr sz="1200"/>
+            </a:lvl5pPr>
+          </a:lstStyle>
+          <a:p>
+            <a:pPr lvl="0"/>
+            <a:r>
+              <a:rPr lang="en-US" dirty="0"/>
+              <a:t>id</a:t>
+            </a:r>
+          </a:p>
+        </p:txBody>
+      </p:sp>
+      <p:sp>
+        <p:nvSpPr>
+          <p:cNvPr id="27" name="stage10">
+            <a:extLst>
+              <a:ext uri="{FF2B5EF4-FFF2-40B4-BE49-F238E27FC236}">
+                <a16:creationId xmlns:a16="http://schemas.microsoft.com/office/drawing/2014/main" id="{3756AD66-CDE9-4F41-8273-99E3A4678ED2}"/>
+              </a:ext>
+            </a:extLst>
+          </p:cNvPr>
+          <p:cNvSpPr>
+            <a:spLocks noGrp="1"/>
+          </p:cNvSpPr>
+          <p:nvPr>
+            <p:ph type="body" sz="quarter" idx="43" hasCustomPrompt="1"/>
+          </p:nvPr>
+        </p:nvSpPr>
+        <p:spPr>
+          <a:xfrm>
+            <a:off x="2535589" y="5530591"/>
+            <a:ext cx="2448553" cy="282967"/>
+          </a:xfrm>
+        </p:spPr>
+        <p:txBody>
+          <a:bodyPr>
+            <a:noAutofit/>
+          </a:bodyPr>
+          <a:lstStyle>
+            <a:lvl1pPr marL="0" indent="0">
+              <a:buNone/>
+              <a:defRPr sz="1300"/>
+            </a:lvl1pPr>
+            <a:lvl2pPr>
+              <a:defRPr sz="1200"/>
+            </a:lvl2pPr>
+            <a:lvl3pPr>
+              <a:defRPr sz="1200"/>
+            </a:lvl3pPr>
+            <a:lvl4pPr>
+              <a:defRPr sz="1200"/>
+            </a:lvl4pPr>
+            <a:lvl5pPr>
+              <a:defRPr sz="1200"/>
+            </a:lvl5pPr>
+          </a:lstStyle>
+          <a:p>
+            <a:pPr lvl="0"/>
+            <a:r>
+              <a:rPr lang="en-US" dirty="0"/>
+              <a:t>id</a:t>
+            </a:r>
+          </a:p>
+        </p:txBody>
+      </p:sp>
+      <p:sp>
+        <p:nvSpPr>
+          <p:cNvPr id="28" name="stage11">
+            <a:extLst>
+              <a:ext uri="{FF2B5EF4-FFF2-40B4-BE49-F238E27FC236}">
+                <a16:creationId xmlns:a16="http://schemas.microsoft.com/office/drawing/2014/main" id="{E836B717-C1D0-4D86-A0D0-0F4FA78C3F3E}"/>
+              </a:ext>
+            </a:extLst>
+          </p:cNvPr>
+          <p:cNvSpPr>
+            <a:spLocks noGrp="1"/>
+          </p:cNvSpPr>
+          <p:nvPr>
+            <p:ph type="body" sz="quarter" idx="44" hasCustomPrompt="1"/>
+          </p:nvPr>
+        </p:nvSpPr>
+        <p:spPr>
+          <a:xfrm>
+            <a:off x="5072205" y="5530588"/>
+            <a:ext cx="2448553" cy="282967"/>
+          </a:xfrm>
+        </p:spPr>
+        <p:txBody>
+          <a:bodyPr>
+            <a:noAutofit/>
+          </a:bodyPr>
+          <a:lstStyle>
+            <a:lvl1pPr marL="0" indent="0">
+              <a:buNone/>
+              <a:defRPr sz="1300"/>
+            </a:lvl1pPr>
+            <a:lvl2pPr>
+              <a:defRPr sz="1200"/>
+            </a:lvl2pPr>
+            <a:lvl3pPr>
+              <a:defRPr sz="1200"/>
+            </a:lvl3pPr>
+            <a:lvl4pPr>
+              <a:defRPr sz="1200"/>
+            </a:lvl4pPr>
+            <a:lvl5pPr>
+              <a:defRPr sz="1200"/>
+            </a:lvl5pPr>
+          </a:lstStyle>
+          <a:p>
+            <a:pPr lvl="0"/>
+            <a:r>
+              <a:rPr lang="en-US" dirty="0"/>
+              <a:t>id</a:t>
+            </a:r>
+          </a:p>
+        </p:txBody>
+      </p:sp>
+      <p:sp>
+        <p:nvSpPr>
+          <p:cNvPr id="29" name="stage12">
+            <a:extLst>
+              <a:ext uri="{FF2B5EF4-FFF2-40B4-BE49-F238E27FC236}">
+                <a16:creationId xmlns:a16="http://schemas.microsoft.com/office/drawing/2014/main" id="{C3665908-CE44-4336-A147-E973D4AD4F24}"/>
+              </a:ext>
+            </a:extLst>
+          </p:cNvPr>
+          <p:cNvSpPr>
+            <a:spLocks noGrp="1"/>
+          </p:cNvSpPr>
+          <p:nvPr>
+            <p:ph type="body" sz="quarter" idx="45" hasCustomPrompt="1"/>
+          </p:nvPr>
+        </p:nvSpPr>
+        <p:spPr>
+          <a:xfrm>
+            <a:off x="7608820" y="5530591"/>
+            <a:ext cx="2448553" cy="282967"/>
+          </a:xfrm>
+        </p:spPr>
+        <p:txBody>
+          <a:bodyPr>
+            <a:noAutofit/>
+          </a:bodyPr>
+          <a:lstStyle>
+            <a:lvl1pPr marL="0" indent="0">
+              <a:buNone/>
+              <a:defRPr sz="1300"/>
+            </a:lvl1pPr>
+            <a:lvl2pPr>
+              <a:defRPr sz="1200"/>
+            </a:lvl2pPr>
+            <a:lvl3pPr>
+              <a:defRPr sz="1200"/>
+            </a:lvl3pPr>
+            <a:lvl4pPr>
+              <a:defRPr sz="1200"/>
+            </a:lvl4pPr>
+            <a:lvl5pPr>
+              <a:defRPr sz="1200"/>
+            </a:lvl5pPr>
+          </a:lstStyle>
+          <a:p>
+            <a:pPr lvl="0"/>
+            <a:r>
+              <a:rPr lang="en-US" dirty="0"/>
+              <a:t>id</a:t>
+            </a:r>
+          </a:p>
+        </p:txBody>
+      </p:sp>
+      <p:sp>
+        <p:nvSpPr>
+          <p:cNvPr id="30" name="stage1">
+            <a:extLst>
+              <a:ext uri="{FF2B5EF4-FFF2-40B4-BE49-F238E27FC236}">
+                <a16:creationId xmlns:a16="http://schemas.microsoft.com/office/drawing/2014/main" id="{71B58674-6225-47EE-8203-1D1F745B95A0}"/>
+              </a:ext>
+            </a:extLst>
+          </p:cNvPr>
+          <p:cNvSpPr>
+            <a:spLocks noGrp="1"/>
+          </p:cNvSpPr>
+          <p:nvPr>
+            <p:ph type="body" sz="quarter" idx="46" hasCustomPrompt="1"/>
+          </p:nvPr>
+        </p:nvSpPr>
+        <p:spPr>
+          <a:xfrm>
+            <a:off x="-1027" y="254595"/>
+            <a:ext cx="2448553" cy="282967"/>
+          </a:xfrm>
+        </p:spPr>
+        <p:txBody>
+          <a:bodyPr>
+            <a:noAutofit/>
+          </a:bodyPr>
+          <a:lstStyle>
+            <a:lvl1pPr marL="0" indent="0">
+              <a:buNone/>
+              <a:defRPr sz="1300"/>
+            </a:lvl1pPr>
+            <a:lvl2pPr>
+              <a:defRPr sz="1200"/>
+            </a:lvl2pPr>
+            <a:lvl3pPr>
+              <a:defRPr sz="1200"/>
+            </a:lvl3pPr>
+            <a:lvl4pPr>
+              <a:defRPr sz="1200"/>
+            </a:lvl4pPr>
+            <a:lvl5pPr>
+              <a:defRPr sz="1200"/>
+            </a:lvl5pPr>
+          </a:lstStyle>
+          <a:p>
+            <a:pPr lvl="0"/>
+            <a:r>
+              <a:rPr lang="en-US" dirty="0"/>
+              <a:t>id</a:t>
+            </a:r>
+          </a:p>
+        </p:txBody>
+      </p:sp>
+      <p:sp>
+        <p:nvSpPr>
+          <p:cNvPr id="31" name="stage2">
+            <a:extLst>
+              <a:ext uri="{FF2B5EF4-FFF2-40B4-BE49-F238E27FC236}">
+                <a16:creationId xmlns:a16="http://schemas.microsoft.com/office/drawing/2014/main" id="{DE2CC20E-FF50-4BF5-AB91-A970C2682543}"/>
+              </a:ext>
+            </a:extLst>
+          </p:cNvPr>
+          <p:cNvSpPr>
+            <a:spLocks noGrp="1"/>
+          </p:cNvSpPr>
+          <p:nvPr>
+            <p:ph type="body" sz="quarter" idx="47" hasCustomPrompt="1"/>
+          </p:nvPr>
+        </p:nvSpPr>
+        <p:spPr>
+          <a:xfrm>
+            <a:off x="2535589" y="254596"/>
+            <a:ext cx="2448553" cy="282967"/>
+          </a:xfrm>
+        </p:spPr>
+        <p:txBody>
+          <a:bodyPr>
+            <a:noAutofit/>
+          </a:bodyPr>
+          <a:lstStyle>
+            <a:lvl1pPr marL="0" indent="0">
+              <a:buNone/>
+              <a:defRPr sz="1300"/>
+            </a:lvl1pPr>
+            <a:lvl2pPr>
+              <a:defRPr sz="1200"/>
+            </a:lvl2pPr>
+            <a:lvl3pPr>
+              <a:defRPr sz="1200"/>
+            </a:lvl3pPr>
+            <a:lvl4pPr>
+              <a:defRPr sz="1200"/>
+            </a:lvl4pPr>
+            <a:lvl5pPr>
+              <a:defRPr sz="1200"/>
+            </a:lvl5pPr>
+          </a:lstStyle>
+          <a:p>
+            <a:pPr lvl="0"/>
+            <a:r>
+              <a:rPr lang="en-US" dirty="0"/>
+              <a:t>id</a:t>
+            </a:r>
+          </a:p>
+        </p:txBody>
+      </p:sp>
+      <p:sp>
+        <p:nvSpPr>
+          <p:cNvPr id="32" name="stage3">
+            <a:extLst>
+              <a:ext uri="{FF2B5EF4-FFF2-40B4-BE49-F238E27FC236}">
+                <a16:creationId xmlns:a16="http://schemas.microsoft.com/office/drawing/2014/main" id="{D9EEC3F3-C668-4A4E-9C99-5C6235AD4247}"/>
+              </a:ext>
+            </a:extLst>
+          </p:cNvPr>
+          <p:cNvSpPr>
+            <a:spLocks noGrp="1"/>
+          </p:cNvSpPr>
+          <p:nvPr>
+            <p:ph type="body" sz="quarter" idx="48" hasCustomPrompt="1"/>
+          </p:nvPr>
+        </p:nvSpPr>
+        <p:spPr>
+          <a:xfrm>
+            <a:off x="5072205" y="254593"/>
+            <a:ext cx="2448553" cy="282967"/>
+          </a:xfrm>
+        </p:spPr>
+        <p:txBody>
+          <a:bodyPr>
+            <a:noAutofit/>
+          </a:bodyPr>
+          <a:lstStyle>
+            <a:lvl1pPr marL="0" indent="0">
+              <a:buNone/>
+              <a:defRPr sz="1300"/>
+            </a:lvl1pPr>
+            <a:lvl2pPr>
+              <a:defRPr sz="1200"/>
+            </a:lvl2pPr>
+            <a:lvl3pPr>
+              <a:defRPr sz="1200"/>
+            </a:lvl3pPr>
+            <a:lvl4pPr>
+              <a:defRPr sz="1200"/>
+            </a:lvl4pPr>
+            <a:lvl5pPr>
+              <a:defRPr sz="1200"/>
+            </a:lvl5pPr>
+          </a:lstStyle>
+          <a:p>
+            <a:pPr lvl="0"/>
+            <a:r>
+              <a:rPr lang="en-US" dirty="0"/>
+              <a:t>id</a:t>
+            </a:r>
+          </a:p>
+        </p:txBody>
+      </p:sp>
+      <p:sp>
+        <p:nvSpPr>
+          <p:cNvPr id="33" name="stage4">
+            <a:extLst>
+              <a:ext uri="{FF2B5EF4-FFF2-40B4-BE49-F238E27FC236}">
+                <a16:creationId xmlns:a16="http://schemas.microsoft.com/office/drawing/2014/main" id="{EA9C8596-0EF4-4B8F-9A70-07AF2F2A03DD}"/>
+              </a:ext>
+            </a:extLst>
+          </p:cNvPr>
+          <p:cNvSpPr>
+            <a:spLocks noGrp="1"/>
+          </p:cNvSpPr>
+          <p:nvPr>
+            <p:ph type="body" sz="quarter" idx="49" hasCustomPrompt="1"/>
+          </p:nvPr>
+        </p:nvSpPr>
+        <p:spPr>
+          <a:xfrm>
+            <a:off x="7608820" y="254596"/>
+            <a:ext cx="2448553" cy="282967"/>
+          </a:xfrm>
+        </p:spPr>
+        <p:txBody>
+          <a:bodyPr>
+            <a:noAutofit/>
+          </a:bodyPr>
+          <a:lstStyle>
+            <a:lvl1pPr marL="0" indent="0">
+              <a:buNone/>
+              <a:defRPr sz="1300"/>
+            </a:lvl1pPr>
+            <a:lvl2pPr>
+              <a:defRPr sz="1200"/>
+            </a:lvl2pPr>
+            <a:lvl3pPr>
+              <a:defRPr sz="1200"/>
+            </a:lvl3pPr>
+            <a:lvl4pPr>
+              <a:defRPr sz="1200"/>
+            </a:lvl4pPr>
+            <a:lvl5pPr>
+              <a:defRPr sz="1200"/>
+            </a:lvl5pPr>
+          </a:lstStyle>
+          <a:p>
+            <a:pPr lvl="0"/>
+            <a:r>
+              <a:rPr lang="en-US" dirty="0"/>
+              <a:t>id</a:t>
+            </a:r>
+          </a:p>
+        </p:txBody>
+      </p:sp>
+      <p:sp>
+        <p:nvSpPr>
+          <p:cNvPr id="34" name="stage5">
+            <a:extLst>
+              <a:ext uri="{FF2B5EF4-FFF2-40B4-BE49-F238E27FC236}">
+                <a16:creationId xmlns:a16="http://schemas.microsoft.com/office/drawing/2014/main" id="{7476FCEB-EA13-4992-9FA6-732AF1273A33}"/>
+              </a:ext>
+            </a:extLst>
+          </p:cNvPr>
+          <p:cNvSpPr>
+            <a:spLocks noGrp="1"/>
+          </p:cNvSpPr>
+          <p:nvPr>
+            <p:ph type="body" sz="quarter" idx="50" hasCustomPrompt="1"/>
+          </p:nvPr>
+        </p:nvSpPr>
+        <p:spPr>
+          <a:xfrm>
+            <a:off x="-1027" y="2838210"/>
+            <a:ext cx="2448553" cy="282967"/>
+          </a:xfrm>
+        </p:spPr>
+        <p:txBody>
+          <a:bodyPr>
+            <a:noAutofit/>
+          </a:bodyPr>
+          <a:lstStyle>
+            <a:lvl1pPr marL="0" indent="0">
+              <a:buNone/>
+              <a:defRPr sz="1300"/>
+            </a:lvl1pPr>
+            <a:lvl2pPr>
+              <a:defRPr sz="1200"/>
+            </a:lvl2pPr>
+            <a:lvl3pPr>
+              <a:defRPr sz="1200"/>
+            </a:lvl3pPr>
+            <a:lvl4pPr>
+              <a:defRPr sz="1200"/>
+            </a:lvl4pPr>
+            <a:lvl5pPr>
+              <a:defRPr sz="1200"/>
+            </a:lvl5pPr>
+          </a:lstStyle>
+          <a:p>
+            <a:pPr lvl="0"/>
+            <a:r>
+              <a:rPr lang="en-US" dirty="0"/>
+              <a:t>id</a:t>
+            </a:r>
+          </a:p>
+        </p:txBody>
+      </p:sp>
+      <p:sp>
+        <p:nvSpPr>
+          <p:cNvPr id="35" name="stage6">
+            <a:extLst>
+              <a:ext uri="{FF2B5EF4-FFF2-40B4-BE49-F238E27FC236}">
+                <a16:creationId xmlns:a16="http://schemas.microsoft.com/office/drawing/2014/main" id="{56AD3CC3-67EA-4944-8AC7-701753DC877A}"/>
+              </a:ext>
+            </a:extLst>
+          </p:cNvPr>
+          <p:cNvSpPr>
+            <a:spLocks noGrp="1"/>
+          </p:cNvSpPr>
+          <p:nvPr>
+            <p:ph type="body" sz="quarter" idx="51" hasCustomPrompt="1"/>
+          </p:nvPr>
+        </p:nvSpPr>
+        <p:spPr>
+          <a:xfrm>
+            <a:off x="2535589" y="2838211"/>
+            <a:ext cx="2448553" cy="282967"/>
+          </a:xfrm>
+        </p:spPr>
+        <p:txBody>
+          <a:bodyPr>
+            <a:noAutofit/>
+          </a:bodyPr>
+          <a:lstStyle>
+            <a:lvl1pPr marL="0" indent="0">
+              <a:buNone/>
+              <a:defRPr sz="1300"/>
+            </a:lvl1pPr>
+            <a:lvl2pPr>
+              <a:defRPr sz="1200"/>
+            </a:lvl2pPr>
+            <a:lvl3pPr>
+              <a:defRPr sz="1200"/>
+            </a:lvl3pPr>
+            <a:lvl4pPr>
+              <a:defRPr sz="1200"/>
+            </a:lvl4pPr>
+            <a:lvl5pPr>
+              <a:defRPr sz="1200"/>
+            </a:lvl5pPr>
+          </a:lstStyle>
+          <a:p>
+            <a:pPr lvl="0"/>
+            <a:r>
+              <a:rPr lang="en-US" dirty="0"/>
+              <a:t>id</a:t>
+            </a:r>
+          </a:p>
+        </p:txBody>
+      </p:sp>
+      <p:sp>
+        <p:nvSpPr>
+          <p:cNvPr id="36" name="stage7">
+            <a:extLst>
+              <a:ext uri="{FF2B5EF4-FFF2-40B4-BE49-F238E27FC236}">
+                <a16:creationId xmlns:a16="http://schemas.microsoft.com/office/drawing/2014/main" id="{57B4B718-B4E5-41B6-BA60-CC32E1A3406D}"/>
+              </a:ext>
+            </a:extLst>
+          </p:cNvPr>
+          <p:cNvSpPr>
+            <a:spLocks noGrp="1"/>
+          </p:cNvSpPr>
+          <p:nvPr>
+            <p:ph type="body" sz="quarter" idx="52" hasCustomPrompt="1"/>
+          </p:nvPr>
+        </p:nvSpPr>
+        <p:spPr>
+          <a:xfrm>
+            <a:off x="5072205" y="2838208"/>
+            <a:ext cx="2448553" cy="282967"/>
+          </a:xfrm>
+        </p:spPr>
+        <p:txBody>
+          <a:bodyPr>
+            <a:noAutofit/>
+          </a:bodyPr>
+          <a:lstStyle>
+            <a:lvl1pPr marL="0" indent="0">
+              <a:buNone/>
+              <a:defRPr sz="1300"/>
+            </a:lvl1pPr>
+            <a:lvl2pPr>
+              <a:defRPr sz="1200"/>
+            </a:lvl2pPr>
+            <a:lvl3pPr>
+              <a:defRPr sz="1200"/>
+            </a:lvl3pPr>
+            <a:lvl4pPr>
+              <a:defRPr sz="1200"/>
+            </a:lvl4pPr>
+            <a:lvl5pPr>
+              <a:defRPr sz="1200"/>
+            </a:lvl5pPr>
+          </a:lstStyle>
+          <a:p>
+            <a:pPr lvl="0"/>
+            <a:r>
+              <a:rPr lang="en-US" dirty="0"/>
+              <a:t>id</a:t>
+            </a:r>
+          </a:p>
+        </p:txBody>
+      </p:sp>
+      <p:sp>
+        <p:nvSpPr>
+          <p:cNvPr id="37" name="stage8">
+            <a:extLst>
+              <a:ext uri="{FF2B5EF4-FFF2-40B4-BE49-F238E27FC236}">
+                <a16:creationId xmlns:a16="http://schemas.microsoft.com/office/drawing/2014/main" id="{EC741E8E-7745-457B-A212-A5B5DEAB7089}"/>
+              </a:ext>
+            </a:extLst>
+          </p:cNvPr>
+          <p:cNvSpPr>
+            <a:spLocks noGrp="1"/>
+          </p:cNvSpPr>
+          <p:nvPr>
+            <p:ph type="body" sz="quarter" idx="53" hasCustomPrompt="1"/>
+          </p:nvPr>
+        </p:nvSpPr>
+        <p:spPr>
+          <a:xfrm>
+            <a:off x="7608820" y="2838211"/>
             <a:ext cx="2448553" cy="282967"/>
           </a:xfrm>
         </p:spPr>
@@ -1172,7 +1805,7 @@
           <a:p>
             <a:fld id="{E89F2658-D281-2E4F-92C0-62272D5815AC}" type="datetimeFigureOut">
               <a:rPr lang="en-US" smtClean="0"/>
-              <a:t>8/22/21</a:t>
+              <a:t>9/23/2021</a:t>
             </a:fld>
             <a:endParaRPr lang="en-US"/>
           </a:p>
@@ -1449,7 +2082,7 @@
           <a:p>
             <a:fld id="{E89F2658-D281-2E4F-92C0-62272D5815AC}" type="datetimeFigureOut">
               <a:rPr lang="en-US" smtClean="0"/>
-              <a:t>8/22/21</a:t>
+              <a:t>9/23/2021</a:t>
             </a:fld>
             <a:endParaRPr lang="en-US"/>
           </a:p>
@@ -1706,7 +2339,7 @@
           <a:p>
             <a:fld id="{E89F2658-D281-2E4F-92C0-62272D5815AC}" type="datetimeFigureOut">
               <a:rPr lang="en-US" smtClean="0"/>
-              <a:t>8/22/21</a:t>
+              <a:t>9/23/2021</a:t>
             </a:fld>
             <a:endParaRPr lang="en-US"/>
           </a:p>
@@ -1876,7 +2509,7 @@
           <a:p>
             <a:fld id="{E89F2658-D281-2E4F-92C0-62272D5815AC}" type="datetimeFigureOut">
               <a:rPr lang="en-US" smtClean="0"/>
-              <a:t>8/22/21</a:t>
+              <a:t>9/23/2021</a:t>
             </a:fld>
             <a:endParaRPr lang="en-US"/>
           </a:p>
@@ -2056,7 +2689,7 @@
           <a:p>
             <a:fld id="{E89F2658-D281-2E4F-92C0-62272D5815AC}" type="datetimeFigureOut">
               <a:rPr lang="en-US" smtClean="0"/>
-              <a:t>8/22/21</a:t>
+              <a:t>9/23/2021</a:t>
             </a:fld>
             <a:endParaRPr lang="en-US"/>
           </a:p>
@@ -2152,7 +2785,7 @@
         </p:nvSpPr>
         <p:spPr>
           <a:xfrm>
-            <a:off x="0" y="282960"/>
+            <a:off x="399963" y="282960"/>
             <a:ext cx="2819516" cy="2251405"/>
           </a:xfrm>
         </p:spPr>
@@ -2182,7 +2815,7 @@
         </p:nvSpPr>
         <p:spPr>
           <a:xfrm>
-            <a:off x="0" y="-1"/>
+            <a:off x="399963" y="-1"/>
             <a:ext cx="2819516" cy="282961"/>
           </a:xfrm>
         </p:spPr>
@@ -2235,7 +2868,7 @@
         </p:nvSpPr>
         <p:spPr>
           <a:xfrm>
-            <a:off x="3619442" y="282968"/>
+            <a:off x="3819423" y="282968"/>
             <a:ext cx="2819516" cy="2253736"/>
           </a:xfrm>
         </p:spPr>
@@ -2265,7 +2898,7 @@
         </p:nvSpPr>
         <p:spPr>
           <a:xfrm>
-            <a:off x="3619442" y="0"/>
+            <a:off x="3819423" y="0"/>
             <a:ext cx="2819516" cy="282961"/>
           </a:xfrm>
         </p:spPr>
@@ -2401,7 +3034,7 @@
         </p:nvSpPr>
         <p:spPr>
           <a:xfrm>
-            <a:off x="0" y="2890673"/>
+            <a:off x="399963" y="2890673"/>
             <a:ext cx="2819516" cy="2253736"/>
           </a:xfrm>
         </p:spPr>
@@ -2431,7 +3064,7 @@
         </p:nvSpPr>
         <p:spPr>
           <a:xfrm>
-            <a:off x="0" y="2580011"/>
+            <a:off x="399963" y="2580011"/>
             <a:ext cx="2819516" cy="282961"/>
           </a:xfrm>
         </p:spPr>
@@ -2484,7 +3117,7 @@
         </p:nvSpPr>
         <p:spPr>
           <a:xfrm>
-            <a:off x="3619442" y="2890673"/>
+            <a:off x="3819423" y="2890673"/>
             <a:ext cx="2819516" cy="2253736"/>
           </a:xfrm>
         </p:spPr>
@@ -2514,7 +3147,7 @@
         </p:nvSpPr>
         <p:spPr>
           <a:xfrm>
-            <a:off x="3619442" y="2592442"/>
+            <a:off x="3819423" y="2592442"/>
             <a:ext cx="2819516" cy="282961"/>
           </a:xfrm>
         </p:spPr>
@@ -2650,7 +3283,7 @@
         </p:nvSpPr>
         <p:spPr>
           <a:xfrm>
-            <a:off x="0" y="5518663"/>
+            <a:off x="399963" y="5518663"/>
             <a:ext cx="2819516" cy="2253736"/>
           </a:xfrm>
         </p:spPr>
@@ -2680,7 +3313,7 @@
         </p:nvSpPr>
         <p:spPr>
           <a:xfrm>
-            <a:off x="0" y="5202041"/>
+            <a:off x="399963" y="5202041"/>
             <a:ext cx="2819516" cy="282961"/>
           </a:xfrm>
         </p:spPr>
@@ -2733,7 +3366,7 @@
         </p:nvSpPr>
         <p:spPr>
           <a:xfrm>
-            <a:off x="3619442" y="5518664"/>
+            <a:off x="3819423" y="5518664"/>
             <a:ext cx="2819516" cy="2253736"/>
           </a:xfrm>
         </p:spPr>
@@ -2763,7 +3396,7 @@
         </p:nvSpPr>
         <p:spPr>
           <a:xfrm>
-            <a:off x="3619442" y="5220022"/>
+            <a:off x="3819423" y="5220022"/>
             <a:ext cx="2819516" cy="282961"/>
           </a:xfrm>
         </p:spPr>
@@ -2877,6 +3510,483 @@
             <a:r>
               <a:rPr lang="en-US" dirty="0"/>
               <a:t>id</a:t>
+            </a:r>
+          </a:p>
+        </p:txBody>
+      </p:sp>
+      <p:sp>
+        <p:nvSpPr>
+          <p:cNvPr id="6" name="stage1">
+            <a:extLst>
+              <a:ext uri="{FF2B5EF4-FFF2-40B4-BE49-F238E27FC236}">
+                <a16:creationId xmlns:a16="http://schemas.microsoft.com/office/drawing/2014/main" id="{74ADDA88-59F3-4F90-B151-B725D81EB219}"/>
+              </a:ext>
+            </a:extLst>
+          </p:cNvPr>
+          <p:cNvSpPr>
+            <a:spLocks noGrp="1"/>
+          </p:cNvSpPr>
+          <p:nvPr>
+            <p:ph type="body" sz="quarter" idx="36" hasCustomPrompt="1"/>
+          </p:nvPr>
+        </p:nvSpPr>
+        <p:spPr>
+          <a:xfrm>
+            <a:off x="135964" y="282575"/>
+            <a:ext cx="314325" cy="2254250"/>
+          </a:xfrm>
+        </p:spPr>
+        <p:txBody>
+          <a:bodyPr vert="vert270" anchor="b">
+            <a:noAutofit/>
+          </a:bodyPr>
+          <a:lstStyle>
+            <a:lvl1pPr marL="0" indent="0" algn="ctr">
+              <a:buNone/>
+              <a:defRPr sz="1600"/>
+            </a:lvl1pPr>
+            <a:lvl2pPr>
+              <a:defRPr sz="1100"/>
+            </a:lvl2pPr>
+            <a:lvl3pPr>
+              <a:defRPr sz="1100"/>
+            </a:lvl3pPr>
+            <a:lvl4pPr>
+              <a:defRPr sz="1100"/>
+            </a:lvl4pPr>
+            <a:lvl5pPr>
+              <a:defRPr sz="1100"/>
+            </a:lvl5pPr>
+          </a:lstStyle>
+          <a:p>
+            <a:pPr lvl="0"/>
+            <a:r>
+              <a:rPr lang="en-US" dirty="0"/>
+              <a:t>stage</a:t>
+            </a:r>
+          </a:p>
+        </p:txBody>
+      </p:sp>
+      <p:sp>
+        <p:nvSpPr>
+          <p:cNvPr id="34" name="stage2">
+            <a:extLst>
+              <a:ext uri="{FF2B5EF4-FFF2-40B4-BE49-F238E27FC236}">
+                <a16:creationId xmlns:a16="http://schemas.microsoft.com/office/drawing/2014/main" id="{CD703F89-5A69-4D44-AB47-1047342F8CDB}"/>
+              </a:ext>
+            </a:extLst>
+          </p:cNvPr>
+          <p:cNvSpPr>
+            <a:spLocks noGrp="1"/>
+          </p:cNvSpPr>
+          <p:nvPr>
+            <p:ph type="body" sz="quarter" idx="37" hasCustomPrompt="1"/>
+          </p:nvPr>
+        </p:nvSpPr>
+        <p:spPr>
+          <a:xfrm>
+            <a:off x="3549213" y="282968"/>
+            <a:ext cx="314325" cy="2254250"/>
+          </a:xfrm>
+        </p:spPr>
+        <p:txBody>
+          <a:bodyPr vert="vert270" anchor="b">
+            <a:noAutofit/>
+          </a:bodyPr>
+          <a:lstStyle>
+            <a:lvl1pPr marL="0" indent="0" algn="ctr">
+              <a:buNone/>
+              <a:defRPr sz="1600"/>
+            </a:lvl1pPr>
+            <a:lvl2pPr>
+              <a:defRPr sz="1100"/>
+            </a:lvl2pPr>
+            <a:lvl3pPr>
+              <a:defRPr sz="1100"/>
+            </a:lvl3pPr>
+            <a:lvl4pPr>
+              <a:defRPr sz="1100"/>
+            </a:lvl4pPr>
+            <a:lvl5pPr>
+              <a:defRPr sz="1100"/>
+            </a:lvl5pPr>
+          </a:lstStyle>
+          <a:p>
+            <a:pPr lvl="0"/>
+            <a:r>
+              <a:rPr lang="en-US" dirty="0"/>
+              <a:t>stage</a:t>
+            </a:r>
+          </a:p>
+        </p:txBody>
+      </p:sp>
+      <p:sp>
+        <p:nvSpPr>
+          <p:cNvPr id="35" name="stage3">
+            <a:extLst>
+              <a:ext uri="{FF2B5EF4-FFF2-40B4-BE49-F238E27FC236}">
+                <a16:creationId xmlns:a16="http://schemas.microsoft.com/office/drawing/2014/main" id="{9CDC4A87-4C2E-4E56-A02E-9A5D450CFF76}"/>
+              </a:ext>
+            </a:extLst>
+          </p:cNvPr>
+          <p:cNvSpPr>
+            <a:spLocks noGrp="1"/>
+          </p:cNvSpPr>
+          <p:nvPr>
+            <p:ph type="body" sz="quarter" idx="38" hasCustomPrompt="1"/>
+          </p:nvPr>
+        </p:nvSpPr>
+        <p:spPr>
+          <a:xfrm>
+            <a:off x="6974798" y="282968"/>
+            <a:ext cx="314325" cy="2254250"/>
+          </a:xfrm>
+        </p:spPr>
+        <p:txBody>
+          <a:bodyPr vert="vert270" anchor="b">
+            <a:noAutofit/>
+          </a:bodyPr>
+          <a:lstStyle>
+            <a:lvl1pPr marL="0" indent="0" algn="ctr">
+              <a:buNone/>
+              <a:defRPr sz="1600"/>
+            </a:lvl1pPr>
+            <a:lvl2pPr>
+              <a:defRPr sz="1100"/>
+            </a:lvl2pPr>
+            <a:lvl3pPr>
+              <a:defRPr sz="1100"/>
+            </a:lvl3pPr>
+            <a:lvl4pPr>
+              <a:defRPr sz="1100"/>
+            </a:lvl4pPr>
+            <a:lvl5pPr>
+              <a:defRPr sz="1100"/>
+            </a:lvl5pPr>
+          </a:lstStyle>
+          <a:p>
+            <a:pPr lvl="0"/>
+            <a:r>
+              <a:rPr lang="en-US" dirty="0"/>
+              <a:t>stage</a:t>
+            </a:r>
+          </a:p>
+        </p:txBody>
+      </p:sp>
+      <p:sp>
+        <p:nvSpPr>
+          <p:cNvPr id="36" name="stage4">
+            <a:extLst>
+              <a:ext uri="{FF2B5EF4-FFF2-40B4-BE49-F238E27FC236}">
+                <a16:creationId xmlns:a16="http://schemas.microsoft.com/office/drawing/2014/main" id="{038FBC6E-CB72-4511-8CA9-DAEA11D65295}"/>
+              </a:ext>
+            </a:extLst>
+          </p:cNvPr>
+          <p:cNvSpPr>
+            <a:spLocks noGrp="1"/>
+          </p:cNvSpPr>
+          <p:nvPr>
+            <p:ph type="body" sz="quarter" idx="39" hasCustomPrompt="1"/>
+          </p:nvPr>
+        </p:nvSpPr>
+        <p:spPr>
+          <a:xfrm>
+            <a:off x="131201" y="2887799"/>
+            <a:ext cx="314325" cy="2254250"/>
+          </a:xfrm>
+        </p:spPr>
+        <p:txBody>
+          <a:bodyPr vert="vert270" anchor="b">
+            <a:noAutofit/>
+          </a:bodyPr>
+          <a:lstStyle>
+            <a:lvl1pPr marL="0" indent="0" algn="ctr">
+              <a:buNone/>
+              <a:defRPr sz="1600"/>
+            </a:lvl1pPr>
+            <a:lvl2pPr>
+              <a:defRPr sz="1100"/>
+            </a:lvl2pPr>
+            <a:lvl3pPr>
+              <a:defRPr sz="1100"/>
+            </a:lvl3pPr>
+            <a:lvl4pPr>
+              <a:defRPr sz="1100"/>
+            </a:lvl4pPr>
+            <a:lvl5pPr>
+              <a:defRPr sz="1100"/>
+            </a:lvl5pPr>
+          </a:lstStyle>
+          <a:p>
+            <a:pPr lvl="0"/>
+            <a:r>
+              <a:rPr lang="en-US" dirty="0"/>
+              <a:t>stage</a:t>
+            </a:r>
+          </a:p>
+        </p:txBody>
+      </p:sp>
+      <p:sp>
+        <p:nvSpPr>
+          <p:cNvPr id="37" name="stage5">
+            <a:extLst>
+              <a:ext uri="{FF2B5EF4-FFF2-40B4-BE49-F238E27FC236}">
+                <a16:creationId xmlns:a16="http://schemas.microsoft.com/office/drawing/2014/main" id="{1511EE02-ED59-421E-A7BD-F0DE5501F442}"/>
+              </a:ext>
+            </a:extLst>
+          </p:cNvPr>
+          <p:cNvSpPr>
+            <a:spLocks noGrp="1"/>
+          </p:cNvSpPr>
+          <p:nvPr>
+            <p:ph type="body" sz="quarter" idx="40" hasCustomPrompt="1"/>
+          </p:nvPr>
+        </p:nvSpPr>
+        <p:spPr>
+          <a:xfrm>
+            <a:off x="3544450" y="2888192"/>
+            <a:ext cx="314325" cy="2254250"/>
+          </a:xfrm>
+        </p:spPr>
+        <p:txBody>
+          <a:bodyPr vert="vert270" anchor="b">
+            <a:noAutofit/>
+          </a:bodyPr>
+          <a:lstStyle>
+            <a:lvl1pPr marL="0" indent="0" algn="ctr">
+              <a:buNone/>
+              <a:defRPr sz="1600"/>
+            </a:lvl1pPr>
+            <a:lvl2pPr>
+              <a:defRPr sz="1100"/>
+            </a:lvl2pPr>
+            <a:lvl3pPr>
+              <a:defRPr sz="1100"/>
+            </a:lvl3pPr>
+            <a:lvl4pPr>
+              <a:defRPr sz="1100"/>
+            </a:lvl4pPr>
+            <a:lvl5pPr>
+              <a:defRPr sz="1100"/>
+            </a:lvl5pPr>
+          </a:lstStyle>
+          <a:p>
+            <a:pPr lvl="0"/>
+            <a:r>
+              <a:rPr lang="en-US" dirty="0"/>
+              <a:t>stage</a:t>
+            </a:r>
+          </a:p>
+        </p:txBody>
+      </p:sp>
+      <p:sp>
+        <p:nvSpPr>
+          <p:cNvPr id="38" name="stage6">
+            <a:extLst>
+              <a:ext uri="{FF2B5EF4-FFF2-40B4-BE49-F238E27FC236}">
+                <a16:creationId xmlns:a16="http://schemas.microsoft.com/office/drawing/2014/main" id="{701F088C-A9FC-4867-9338-B46E595600E5}"/>
+              </a:ext>
+            </a:extLst>
+          </p:cNvPr>
+          <p:cNvSpPr>
+            <a:spLocks noGrp="1"/>
+          </p:cNvSpPr>
+          <p:nvPr>
+            <p:ph type="body" sz="quarter" idx="41" hasCustomPrompt="1"/>
+          </p:nvPr>
+        </p:nvSpPr>
+        <p:spPr>
+          <a:xfrm>
+            <a:off x="6970035" y="2888192"/>
+            <a:ext cx="314325" cy="2254250"/>
+          </a:xfrm>
+        </p:spPr>
+        <p:txBody>
+          <a:bodyPr vert="vert270" anchor="b">
+            <a:noAutofit/>
+          </a:bodyPr>
+          <a:lstStyle>
+            <a:lvl1pPr marL="0" indent="0" algn="ctr">
+              <a:buNone/>
+              <a:defRPr sz="1600"/>
+            </a:lvl1pPr>
+            <a:lvl2pPr>
+              <a:defRPr sz="1100"/>
+            </a:lvl2pPr>
+            <a:lvl3pPr>
+              <a:defRPr sz="1100"/>
+            </a:lvl3pPr>
+            <a:lvl4pPr>
+              <a:defRPr sz="1100"/>
+            </a:lvl4pPr>
+            <a:lvl5pPr>
+              <a:defRPr sz="1100"/>
+            </a:lvl5pPr>
+          </a:lstStyle>
+          <a:p>
+            <a:pPr lvl="0"/>
+            <a:r>
+              <a:rPr lang="en-US" dirty="0"/>
+              <a:t>stage</a:t>
+            </a:r>
+          </a:p>
+        </p:txBody>
+      </p:sp>
+      <p:sp>
+        <p:nvSpPr>
+          <p:cNvPr id="39" name="stage7">
+            <a:extLst>
+              <a:ext uri="{FF2B5EF4-FFF2-40B4-BE49-F238E27FC236}">
+                <a16:creationId xmlns:a16="http://schemas.microsoft.com/office/drawing/2014/main" id="{7DC25CD7-25A4-4E38-B93F-E66DA99CBA68}"/>
+              </a:ext>
+            </a:extLst>
+          </p:cNvPr>
+          <p:cNvSpPr>
+            <a:spLocks noGrp="1"/>
+          </p:cNvSpPr>
+          <p:nvPr>
+            <p:ph type="body" sz="quarter" idx="42" hasCustomPrompt="1"/>
+          </p:nvPr>
+        </p:nvSpPr>
+        <p:spPr>
+          <a:xfrm>
+            <a:off x="126438" y="5517756"/>
+            <a:ext cx="314325" cy="2254250"/>
+          </a:xfrm>
+        </p:spPr>
+        <p:txBody>
+          <a:bodyPr vert="vert270" anchor="b">
+            <a:noAutofit/>
+          </a:bodyPr>
+          <a:lstStyle>
+            <a:lvl1pPr marL="0" indent="0" algn="ctr">
+              <a:buNone/>
+              <a:defRPr sz="1600"/>
+            </a:lvl1pPr>
+            <a:lvl2pPr>
+              <a:defRPr sz="1100"/>
+            </a:lvl2pPr>
+            <a:lvl3pPr>
+              <a:defRPr sz="1100"/>
+            </a:lvl3pPr>
+            <a:lvl4pPr>
+              <a:defRPr sz="1100"/>
+            </a:lvl4pPr>
+            <a:lvl5pPr>
+              <a:defRPr sz="1100"/>
+            </a:lvl5pPr>
+          </a:lstStyle>
+          <a:p>
+            <a:pPr lvl="0"/>
+            <a:r>
+              <a:rPr lang="en-US" dirty="0"/>
+              <a:t>stage</a:t>
+            </a:r>
+          </a:p>
+        </p:txBody>
+      </p:sp>
+      <p:sp>
+        <p:nvSpPr>
+          <p:cNvPr id="40" name="stage8">
+            <a:extLst>
+              <a:ext uri="{FF2B5EF4-FFF2-40B4-BE49-F238E27FC236}">
+                <a16:creationId xmlns:a16="http://schemas.microsoft.com/office/drawing/2014/main" id="{8FD1A405-0D6D-4734-920C-ED3A4567B064}"/>
+              </a:ext>
+            </a:extLst>
+          </p:cNvPr>
+          <p:cNvSpPr>
+            <a:spLocks noGrp="1"/>
+          </p:cNvSpPr>
+          <p:nvPr>
+            <p:ph type="body" sz="quarter" idx="43" hasCustomPrompt="1"/>
+          </p:nvPr>
+        </p:nvSpPr>
+        <p:spPr>
+          <a:xfrm>
+            <a:off x="3539687" y="5518149"/>
+            <a:ext cx="314325" cy="2254250"/>
+          </a:xfrm>
+        </p:spPr>
+        <p:txBody>
+          <a:bodyPr vert="vert270" anchor="b">
+            <a:noAutofit/>
+          </a:bodyPr>
+          <a:lstStyle>
+            <a:lvl1pPr marL="0" indent="0" algn="ctr">
+              <a:buNone/>
+              <a:defRPr sz="1600"/>
+            </a:lvl1pPr>
+            <a:lvl2pPr>
+              <a:defRPr sz="1100"/>
+            </a:lvl2pPr>
+            <a:lvl3pPr>
+              <a:defRPr sz="1100"/>
+            </a:lvl3pPr>
+            <a:lvl4pPr>
+              <a:defRPr sz="1100"/>
+            </a:lvl4pPr>
+            <a:lvl5pPr>
+              <a:defRPr sz="1100"/>
+            </a:lvl5pPr>
+          </a:lstStyle>
+          <a:p>
+            <a:pPr lvl="0"/>
+            <a:r>
+              <a:rPr lang="en-US" dirty="0"/>
+              <a:t>stage</a:t>
+            </a:r>
+          </a:p>
+        </p:txBody>
+      </p:sp>
+      <p:sp>
+        <p:nvSpPr>
+          <p:cNvPr id="41" name="stage9">
+            <a:extLst>
+              <a:ext uri="{FF2B5EF4-FFF2-40B4-BE49-F238E27FC236}">
+                <a16:creationId xmlns:a16="http://schemas.microsoft.com/office/drawing/2014/main" id="{47361863-A794-4141-8917-5849DC4C5ECE}"/>
+              </a:ext>
+            </a:extLst>
+          </p:cNvPr>
+          <p:cNvSpPr>
+            <a:spLocks noGrp="1"/>
+          </p:cNvSpPr>
+          <p:nvPr>
+            <p:ph type="body" sz="quarter" idx="44" hasCustomPrompt="1"/>
+          </p:nvPr>
+        </p:nvSpPr>
+        <p:spPr>
+          <a:xfrm>
+            <a:off x="6965272" y="5518149"/>
+            <a:ext cx="314325" cy="2254250"/>
+          </a:xfrm>
+        </p:spPr>
+        <p:txBody>
+          <a:bodyPr vert="vert270" anchor="b">
+            <a:noAutofit/>
+          </a:bodyPr>
+          <a:lstStyle>
+            <a:lvl1pPr marL="0" indent="0" algn="ctr">
+              <a:buNone/>
+              <a:defRPr sz="1600"/>
+            </a:lvl1pPr>
+            <a:lvl2pPr>
+              <a:defRPr sz="1100"/>
+            </a:lvl2pPr>
+            <a:lvl3pPr>
+              <a:defRPr sz="1100"/>
+            </a:lvl3pPr>
+            <a:lvl4pPr>
+              <a:defRPr sz="1100"/>
+            </a:lvl4pPr>
+            <a:lvl5pPr>
+              <a:defRPr sz="1100"/>
+            </a:lvl5pPr>
+          </a:lstStyle>
+          <a:p>
+            <a:pPr lvl="0"/>
+            <a:r>
+              <a:rPr lang="en-US" dirty="0"/>
+              <a:t>stage</a:t>
             </a:r>
           </a:p>
         </p:txBody>
@@ -2959,8 +4069,8 @@
         </p:nvSpPr>
         <p:spPr>
           <a:xfrm>
-            <a:off x="5589638" y="3917406"/>
-            <a:ext cx="4468761" cy="282960"/>
+            <a:off x="5589638" y="3917405"/>
+            <a:ext cx="2230735" cy="286241"/>
           </a:xfrm>
         </p:spPr>
         <p:txBody>
@@ -3043,7 +4153,7 @@
         <p:spPr>
           <a:xfrm>
             <a:off x="5589639" y="0"/>
-            <a:ext cx="4468761" cy="282960"/>
+            <a:ext cx="2234379" cy="282960"/>
           </a:xfrm>
         </p:spPr>
         <p:txBody>
@@ -3125,8 +4235,8 @@
         </p:nvSpPr>
         <p:spPr>
           <a:xfrm>
-            <a:off x="-1" y="3917406"/>
-            <a:ext cx="4468761" cy="282960"/>
+            <a:off x="0" y="3917406"/>
+            <a:ext cx="2230734" cy="282960"/>
           </a:xfrm>
         </p:spPr>
         <p:txBody>
@@ -3208,8 +4318,8 @@
         </p:nvSpPr>
         <p:spPr>
           <a:xfrm>
-            <a:off x="0" y="0"/>
-            <a:ext cx="4468761" cy="282960"/>
+            <a:off x="1" y="0"/>
+            <a:ext cx="2230734" cy="282960"/>
           </a:xfrm>
         </p:spPr>
         <p:txBody>
@@ -3239,6 +4349,218 @@
             <a:r>
               <a:rPr lang="en-US" dirty="0"/>
               <a:t>id</a:t>
+            </a:r>
+          </a:p>
+        </p:txBody>
+      </p:sp>
+      <p:sp>
+        <p:nvSpPr>
+          <p:cNvPr id="14" name="stage1">
+            <a:extLst>
+              <a:ext uri="{FF2B5EF4-FFF2-40B4-BE49-F238E27FC236}">
+                <a16:creationId xmlns:a16="http://schemas.microsoft.com/office/drawing/2014/main" id="{FECFDA5D-33B1-4BC2-B202-B0D7293239F7}"/>
+              </a:ext>
+            </a:extLst>
+          </p:cNvPr>
+          <p:cNvSpPr>
+            <a:spLocks noGrp="1"/>
+          </p:cNvSpPr>
+          <p:nvPr>
+            <p:ph type="body" sz="quarter" idx="33" hasCustomPrompt="1"/>
+          </p:nvPr>
+        </p:nvSpPr>
+        <p:spPr>
+          <a:xfrm>
+            <a:off x="2249751" y="0"/>
+            <a:ext cx="2230734" cy="282960"/>
+          </a:xfrm>
+        </p:spPr>
+        <p:txBody>
+          <a:bodyPr>
+            <a:noAutofit/>
+          </a:bodyPr>
+          <a:lstStyle>
+            <a:lvl1pPr marL="0" indent="0">
+              <a:buNone/>
+              <a:defRPr sz="1300"/>
+            </a:lvl1pPr>
+            <a:lvl2pPr>
+              <a:defRPr sz="1200"/>
+            </a:lvl2pPr>
+            <a:lvl3pPr>
+              <a:defRPr sz="1200"/>
+            </a:lvl3pPr>
+            <a:lvl4pPr>
+              <a:defRPr sz="1200"/>
+            </a:lvl4pPr>
+            <a:lvl5pPr>
+              <a:defRPr sz="1200"/>
+            </a:lvl5pPr>
+          </a:lstStyle>
+          <a:p>
+            <a:pPr lvl="0"/>
+            <a:r>
+              <a:rPr lang="en-US" dirty="0"/>
+              <a:t>Stage</a:t>
+            </a:r>
+          </a:p>
+        </p:txBody>
+      </p:sp>
+      <p:sp>
+        <p:nvSpPr>
+          <p:cNvPr id="15" name="stage2">
+            <a:extLst>
+              <a:ext uri="{FF2B5EF4-FFF2-40B4-BE49-F238E27FC236}">
+                <a16:creationId xmlns:a16="http://schemas.microsoft.com/office/drawing/2014/main" id="{F7AD1D40-4C12-43B7-8117-011F4B7CDC48}"/>
+              </a:ext>
+            </a:extLst>
+          </p:cNvPr>
+          <p:cNvSpPr>
+            <a:spLocks noGrp="1"/>
+          </p:cNvSpPr>
+          <p:nvPr>
+            <p:ph type="body" sz="quarter" idx="34" hasCustomPrompt="1"/>
+          </p:nvPr>
+        </p:nvSpPr>
+        <p:spPr>
+          <a:xfrm>
+            <a:off x="7824018" y="0"/>
+            <a:ext cx="2230734" cy="282960"/>
+          </a:xfrm>
+        </p:spPr>
+        <p:txBody>
+          <a:bodyPr>
+            <a:noAutofit/>
+          </a:bodyPr>
+          <a:lstStyle>
+            <a:lvl1pPr marL="0" indent="0">
+              <a:buNone/>
+              <a:defRPr sz="1300"/>
+            </a:lvl1pPr>
+            <a:lvl2pPr>
+              <a:defRPr sz="1200"/>
+            </a:lvl2pPr>
+            <a:lvl3pPr>
+              <a:defRPr sz="1200"/>
+            </a:lvl3pPr>
+            <a:lvl4pPr>
+              <a:defRPr sz="1200"/>
+            </a:lvl4pPr>
+            <a:lvl5pPr>
+              <a:defRPr sz="1200"/>
+            </a:lvl5pPr>
+          </a:lstStyle>
+          <a:p>
+            <a:pPr lvl="0"/>
+            <a:r>
+              <a:rPr lang="en-US" dirty="0"/>
+              <a:t>Stage</a:t>
+            </a:r>
+          </a:p>
+        </p:txBody>
+      </p:sp>
+      <p:sp>
+        <p:nvSpPr>
+          <p:cNvPr id="16" name="stage3">
+            <a:extLst>
+              <a:ext uri="{FF2B5EF4-FFF2-40B4-BE49-F238E27FC236}">
+                <a16:creationId xmlns:a16="http://schemas.microsoft.com/office/drawing/2014/main" id="{1A88010B-18D1-480D-8873-B4E7AD24C9C1}"/>
+              </a:ext>
+            </a:extLst>
+          </p:cNvPr>
+          <p:cNvSpPr>
+            <a:spLocks noGrp="1"/>
+          </p:cNvSpPr>
+          <p:nvPr>
+            <p:ph type="body" sz="quarter" idx="35" hasCustomPrompt="1"/>
+          </p:nvPr>
+        </p:nvSpPr>
+        <p:spPr>
+          <a:xfrm>
+            <a:off x="2238027" y="3920687"/>
+            <a:ext cx="2230734" cy="282960"/>
+          </a:xfrm>
+        </p:spPr>
+        <p:txBody>
+          <a:bodyPr>
+            <a:noAutofit/>
+          </a:bodyPr>
+          <a:lstStyle>
+            <a:lvl1pPr marL="0" indent="0">
+              <a:buNone/>
+              <a:defRPr sz="1300"/>
+            </a:lvl1pPr>
+            <a:lvl2pPr>
+              <a:defRPr sz="1200"/>
+            </a:lvl2pPr>
+            <a:lvl3pPr>
+              <a:defRPr sz="1200"/>
+            </a:lvl3pPr>
+            <a:lvl4pPr>
+              <a:defRPr sz="1200"/>
+            </a:lvl4pPr>
+            <a:lvl5pPr>
+              <a:defRPr sz="1200"/>
+            </a:lvl5pPr>
+          </a:lstStyle>
+          <a:p>
+            <a:pPr lvl="0"/>
+            <a:r>
+              <a:rPr lang="en-US" dirty="0"/>
+              <a:t>Stage</a:t>
+            </a:r>
+          </a:p>
+        </p:txBody>
+      </p:sp>
+      <p:sp>
+        <p:nvSpPr>
+          <p:cNvPr id="17" name="stage4">
+            <a:extLst>
+              <a:ext uri="{FF2B5EF4-FFF2-40B4-BE49-F238E27FC236}">
+                <a16:creationId xmlns:a16="http://schemas.microsoft.com/office/drawing/2014/main" id="{FC8D62DE-3233-4788-B81F-646DFC9E2BFE}"/>
+              </a:ext>
+            </a:extLst>
+          </p:cNvPr>
+          <p:cNvSpPr>
+            <a:spLocks noGrp="1"/>
+          </p:cNvSpPr>
+          <p:nvPr>
+            <p:ph type="body" sz="quarter" idx="36" hasCustomPrompt="1"/>
+          </p:nvPr>
+        </p:nvSpPr>
+        <p:spPr>
+          <a:xfrm>
+            <a:off x="7827666" y="3917406"/>
+            <a:ext cx="2230734" cy="282960"/>
+          </a:xfrm>
+        </p:spPr>
+        <p:txBody>
+          <a:bodyPr>
+            <a:noAutofit/>
+          </a:bodyPr>
+          <a:lstStyle>
+            <a:lvl1pPr marL="0" indent="0">
+              <a:buNone/>
+              <a:defRPr sz="1300"/>
+            </a:lvl1pPr>
+            <a:lvl2pPr>
+              <a:defRPr sz="1200"/>
+            </a:lvl2pPr>
+            <a:lvl3pPr>
+              <a:defRPr sz="1200"/>
+            </a:lvl3pPr>
+            <a:lvl4pPr>
+              <a:defRPr sz="1200"/>
+            </a:lvl4pPr>
+            <a:lvl5pPr>
+              <a:defRPr sz="1200"/>
+            </a:lvl5pPr>
+          </a:lstStyle>
+          <a:p>
+            <a:pPr lvl="0"/>
+            <a:r>
+              <a:rPr lang="en-US" dirty="0"/>
+              <a:t>Stage</a:t>
             </a:r>
           </a:p>
         </p:txBody>
@@ -3387,7 +4709,7 @@
           <a:p>
             <a:fld id="{E89F2658-D281-2E4F-92C0-62272D5815AC}" type="datetimeFigureOut">
               <a:rPr lang="en-US" smtClean="0"/>
-              <a:t>8/22/21</a:t>
+              <a:t>9/23/2021</a:t>
             </a:fld>
             <a:endParaRPr lang="en-US"/>
           </a:p>
@@ -3557,7 +4879,7 @@
           <a:p>
             <a:fld id="{E89F2658-D281-2E4F-92C0-62272D5815AC}" type="datetimeFigureOut">
               <a:rPr lang="en-US" smtClean="0"/>
-              <a:t>8/22/21</a:t>
+              <a:t>9/23/2021</a:t>
             </a:fld>
             <a:endParaRPr lang="en-US"/>
           </a:p>
@@ -3801,7 +5123,7 @@
           <a:p>
             <a:fld id="{E89F2658-D281-2E4F-92C0-62272D5815AC}" type="datetimeFigureOut">
               <a:rPr lang="en-US" smtClean="0"/>
-              <a:t>8/22/21</a:t>
+              <a:t>9/23/2021</a:t>
             </a:fld>
             <a:endParaRPr lang="en-US"/>
           </a:p>
@@ -4033,7 +5355,7 @@
           <a:p>
             <a:fld id="{E89F2658-D281-2E4F-92C0-62272D5815AC}" type="datetimeFigureOut">
               <a:rPr lang="en-US" smtClean="0"/>
-              <a:t>8/22/21</a:t>
+              <a:t>9/23/2021</a:t>
             </a:fld>
             <a:endParaRPr lang="en-US"/>
           </a:p>
@@ -4400,7 +5722,7 @@
           <a:p>
             <a:fld id="{E89F2658-D281-2E4F-92C0-62272D5815AC}" type="datetimeFigureOut">
               <a:rPr lang="en-US" smtClean="0"/>
-              <a:t>8/22/21</a:t>
+              <a:t>9/23/2021</a:t>
             </a:fld>
             <a:endParaRPr lang="en-US"/>
           </a:p>
@@ -4518,7 +5840,7 @@
           <a:p>
             <a:fld id="{E89F2658-D281-2E4F-92C0-62272D5815AC}" type="datetimeFigureOut">
               <a:rPr lang="en-US" smtClean="0"/>
-              <a:t>8/22/21</a:t>
+              <a:t>9/23/2021</a:t>
             </a:fld>
             <a:endParaRPr lang="en-US"/>
           </a:p>
@@ -4731,7 +6053,7 @@
           <a:p>
             <a:fld id="{E89F2658-D281-2E4F-92C0-62272D5815AC}" type="datetimeFigureOut">
               <a:rPr lang="en-US" smtClean="0"/>
-              <a:t>8/22/21</a:t>
+              <a:t>9/23/2021</a:t>
             </a:fld>
             <a:endParaRPr lang="en-US"/>
           </a:p>
@@ -5122,86 +6444,6 @@
 </p:sldMaster>
 </file>
 
-<file path=ppt/slides/slide1.xml><?xml version="1.0" encoding="utf-8"?>
-<p:sld xmlns:a="http://schemas.openxmlformats.org/drawingml/2006/main" xmlns:r="http://schemas.openxmlformats.org/officeDocument/2006/relationships" xmlns:p="http://schemas.openxmlformats.org/presentationml/2006/main">
-  <p:cSld>
-    <p:spTree>
-      <p:nvGrpSpPr>
-        <p:cNvPr id="1" name=""/>
-        <p:cNvGrpSpPr/>
-        <p:nvPr/>
-      </p:nvGrpSpPr>
-      <p:grpSpPr>
-        <a:xfrm>
-          <a:off x="0" y="0"/>
-          <a:ext cx="0" cy="0"/>
-          <a:chOff x="0" y="0"/>
-          <a:chExt cx="0" cy="0"/>
-        </a:xfrm>
-      </p:grpSpPr>
-      <p:sp>
-        <p:nvSpPr>
-          <p:cNvPr id="2" name="Title 1">
-            <a:extLst>
-              <a:ext uri="{FF2B5EF4-FFF2-40B4-BE49-F238E27FC236}">
-                <a16:creationId xmlns:a16="http://schemas.microsoft.com/office/drawing/2014/main" id="{F719EAAE-BEBD-4B43-BE8F-E9A715868EC5}"/>
-              </a:ext>
-            </a:extLst>
-          </p:cNvPr>
-          <p:cNvSpPr>
-            <a:spLocks noGrp="1"/>
-          </p:cNvSpPr>
-          <p:nvPr>
-            <p:ph type="ctrTitle"/>
-          </p:nvPr>
-        </p:nvSpPr>
-        <p:spPr/>
-        <p:txBody>
-          <a:bodyPr/>
-          <a:lstStyle/>
-          <a:p>
-            <a:endParaRPr lang="en-US"/>
-          </a:p>
-        </p:txBody>
-      </p:sp>
-      <p:sp>
-        <p:nvSpPr>
-          <p:cNvPr id="3" name="Subtitle 2">
-            <a:extLst>
-              <a:ext uri="{FF2B5EF4-FFF2-40B4-BE49-F238E27FC236}">
-                <a16:creationId xmlns:a16="http://schemas.microsoft.com/office/drawing/2014/main" id="{B48E78FE-FC94-7741-B42A-6DD402565B7F}"/>
-              </a:ext>
-            </a:extLst>
-          </p:cNvPr>
-          <p:cNvSpPr>
-            <a:spLocks noGrp="1"/>
-          </p:cNvSpPr>
-          <p:nvPr>
-            <p:ph type="subTitle" idx="1"/>
-          </p:nvPr>
-        </p:nvSpPr>
-        <p:spPr/>
-        <p:txBody>
-          <a:bodyPr/>
-          <a:lstStyle/>
-          <a:p>
-            <a:endParaRPr lang="en-US"/>
-          </a:p>
-        </p:txBody>
-      </p:sp>
-    </p:spTree>
-    <p:extLst>
-      <p:ext uri="{BB962C8B-B14F-4D97-AF65-F5344CB8AC3E}">
-        <p14:creationId xmlns:p14="http://schemas.microsoft.com/office/powerpoint/2010/main" val="3305258441"/>
-      </p:ext>
-    </p:extLst>
-  </p:cSld>
-  <p:clrMapOvr>
-    <a:masterClrMapping/>
-  </p:clrMapOvr>
-</p:sld>
-</file>
-
 <file path=ppt/theme/theme1.xml><?xml version="1.0" encoding="utf-8"?>
 <a:theme xmlns:a="http://schemas.openxmlformats.org/drawingml/2006/main" name="Office Theme">
   <a:themeElements>

</xml_diff>